<commit_message>
power point presentation group members included
</commit_message>
<xml_diff>
--- a/JAVA PRESENTATION.pptx
+++ b/JAVA PRESENTATION.pptx
@@ -6,14 +6,15 @@
   </p:sldMasterIdLst>
   <p:sldIdLst>
     <p:sldId id="257" r:id="rId2"/>
-    <p:sldId id="258" r:id="rId3"/>
-    <p:sldId id="259" r:id="rId4"/>
-    <p:sldId id="260" r:id="rId5"/>
-    <p:sldId id="261" r:id="rId6"/>
-    <p:sldId id="262" r:id="rId7"/>
-    <p:sldId id="263" r:id="rId8"/>
-    <p:sldId id="264" r:id="rId9"/>
-    <p:sldId id="265" r:id="rId10"/>
+    <p:sldId id="266" r:id="rId3"/>
+    <p:sldId id="258" r:id="rId4"/>
+    <p:sldId id="259" r:id="rId5"/>
+    <p:sldId id="260" r:id="rId6"/>
+    <p:sldId id="261" r:id="rId7"/>
+    <p:sldId id="262" r:id="rId8"/>
+    <p:sldId id="263" r:id="rId9"/>
+    <p:sldId id="264" r:id="rId10"/>
+    <p:sldId id="265" r:id="rId11"/>
   </p:sldIdLst>
   <p:sldSz cx="12192000" cy="6858000"/>
   <p:notesSz cx="6858000" cy="9144000"/>
@@ -5634,6 +5635,102 @@
 </p:sld>
 </file>
 
+<file path=ppt/slides/slide10.xml><?xml version="1.0" encoding="utf-8"?>
+<p:sld xmlns:a="http://schemas.openxmlformats.org/drawingml/2006/main" xmlns:r="http://schemas.openxmlformats.org/officeDocument/2006/relationships" xmlns:p="http://schemas.openxmlformats.org/presentationml/2006/main">
+  <p:cSld>
+    <p:spTree>
+      <p:nvGrpSpPr>
+        <p:cNvPr id="1" name=""/>
+        <p:cNvGrpSpPr/>
+        <p:nvPr/>
+      </p:nvGrpSpPr>
+      <p:grpSpPr>
+        <a:xfrm>
+          <a:off x="0" y="0"/>
+          <a:ext cx="0" cy="0"/>
+          <a:chOff x="0" y="0"/>
+          <a:chExt cx="0" cy="0"/>
+        </a:xfrm>
+      </p:grpSpPr>
+      <p:sp>
+        <p:nvSpPr>
+          <p:cNvPr id="3" name="Content Placeholder 2">
+            <a:extLst>
+              <a:ext uri="{FF2B5EF4-FFF2-40B4-BE49-F238E27FC236}">
+                <a16:creationId xmlns:a16="http://schemas.microsoft.com/office/drawing/2014/main" id="{11CADB5B-A810-1065-0DBF-FDA0168C899D}"/>
+              </a:ext>
+            </a:extLst>
+          </p:cNvPr>
+          <p:cNvSpPr>
+            <a:spLocks noGrp="1"/>
+          </p:cNvSpPr>
+          <p:nvPr>
+            <p:ph idx="1"/>
+          </p:nvPr>
+        </p:nvSpPr>
+        <p:spPr>
+          <a:xfrm>
+            <a:off x="913795" y="0"/>
+            <a:ext cx="10353762" cy="6858000"/>
+          </a:xfrm>
+        </p:spPr>
+        <p:txBody>
+          <a:bodyPr>
+            <a:normAutofit/>
+          </a:bodyPr>
+          <a:lstStyle/>
+          <a:p>
+            <a:pPr marL="0" indent="0">
+              <a:buNone/>
+            </a:pPr>
+            <a:r>
+              <a:rPr lang="en-US" sz="4000" dirty="0"/>
+              <a:t>                          </a:t>
+            </a:r>
+            <a:r>
+              <a:rPr lang="en-US" sz="4000" u="sng" dirty="0"/>
+              <a:t>Summary</a:t>
+            </a:r>
+          </a:p>
+          <a:p>
+            <a:r>
+              <a:rPr lang="en-US" sz="4000" dirty="0"/>
+              <a:t>Robust student management application</a:t>
+            </a:r>
+          </a:p>
+          <a:p>
+            <a:r>
+              <a:rPr lang="en-US" sz="4000" dirty="0"/>
+              <a:t>Combines console and GUI interfaces</a:t>
+            </a:r>
+          </a:p>
+          <a:p>
+            <a:r>
+              <a:rPr lang="en-US" sz="4000" dirty="0"/>
+              <a:t>Demonstrates core Java programming skills</a:t>
+            </a:r>
+          </a:p>
+          <a:p>
+            <a:r>
+              <a:rPr lang="en-US" sz="4000" dirty="0"/>
+              <a:t>Thread-safe and persistent data management</a:t>
+            </a:r>
+          </a:p>
+        </p:txBody>
+      </p:sp>
+    </p:spTree>
+    <p:extLst>
+      <p:ext uri="{BB962C8B-B14F-4D97-AF65-F5344CB8AC3E}">
+        <p14:creationId xmlns:p14="http://schemas.microsoft.com/office/powerpoint/2010/main" val="4282689825"/>
+      </p:ext>
+    </p:extLst>
+  </p:cSld>
+  <p:clrMapOvr>
+    <a:masterClrMapping/>
+  </p:clrMapOvr>
+</p:sld>
+</file>
+
 <file path=ppt/slides/slide2.xml><?xml version="1.0" encoding="utf-8"?>
 <p:sld xmlns:a="http://schemas.openxmlformats.org/drawingml/2006/main" xmlns:r="http://schemas.openxmlformats.org/officeDocument/2006/relationships" xmlns:p="http://schemas.openxmlformats.org/presentationml/2006/main">
   <p:cSld>
@@ -5656,7 +5753,7 @@
           <p:cNvPr id="3" name="Content Placeholder 2">
             <a:extLst>
               <a:ext uri="{FF2B5EF4-FFF2-40B4-BE49-F238E27FC236}">
-                <a16:creationId xmlns:a16="http://schemas.microsoft.com/office/drawing/2014/main" id="{FE2A64CE-A892-4721-44D5-44CFC7478F69}"/>
+                <a16:creationId xmlns:a16="http://schemas.microsoft.com/office/drawing/2014/main" id="{9C2B940C-04F4-1370-28BF-ABD317920ED5}"/>
               </a:ext>
             </a:extLst>
           </p:cNvPr>
@@ -5669,98 +5766,238 @@
         </p:nvSpPr>
         <p:spPr>
           <a:xfrm>
-            <a:off x="919119" y="724463"/>
-            <a:ext cx="10353762" cy="5876361"/>
+            <a:off x="913795" y="0"/>
+            <a:ext cx="10353762" cy="6858000"/>
           </a:xfrm>
         </p:spPr>
         <p:txBody>
-          <a:bodyPr>
-            <a:normAutofit/>
-          </a:bodyPr>
-          <a:lstStyle/>
-          <a:p>
-            <a:pPr marL="0" indent="0">
+          <a:bodyPr/>
+          <a:lstStyle/>
+          <a:p>
+            <a:pPr marL="0" marR="0">
+              <a:lnSpc>
+                <a:spcPct val="200000"/>
+              </a:lnSpc>
+              <a:spcAft>
+                <a:spcPts val="800"/>
+              </a:spcAft>
               <a:buNone/>
             </a:pPr>
             <a:r>
-              <a:rPr lang="en-US" sz="3200" dirty="0">
+              <a:rPr lang="en-US" sz="1800" u="sng" kern="100" dirty="0">
+                <a:effectLst/>
                 <a:latin typeface="Times New Roman" panose="02020603050405020304" pitchFamily="18" charset="0"/>
+                <a:ea typeface="Calibri" panose="020F0502020204030204" pitchFamily="34" charset="0"/>
                 <a:cs typeface="Times New Roman" panose="02020603050405020304" pitchFamily="18" charset="0"/>
               </a:rPr>
-              <a:t>            </a:t>
-            </a:r>
-            <a:r>
-              <a:rPr lang="en-US" sz="3200" u="sng" dirty="0">
+              <a:t>GROUP  MEM</a:t>
+            </a:r>
+            <a:r>
+              <a:rPr lang="en-US" sz="1800" u="sng" kern="100" dirty="0">
                 <a:latin typeface="Times New Roman" panose="02020603050405020304" pitchFamily="18" charset="0"/>
+                <a:ea typeface="Calibri" panose="020F0502020204030204" pitchFamily="34" charset="0"/>
                 <a:cs typeface="Times New Roman" panose="02020603050405020304" pitchFamily="18" charset="0"/>
               </a:rPr>
-              <a:t>Purpose: Manage student records efficiently</a:t>
-            </a:r>
-          </a:p>
-          <a:p>
-            <a:r>
-              <a:rPr lang="en-US" sz="3200" dirty="0">
+              <a:t>BERS</a:t>
+            </a:r>
+            <a:r>
+              <a:rPr lang="en-US" sz="1600" kern="100" dirty="0">
                 <a:latin typeface="Times New Roman" panose="02020603050405020304" pitchFamily="18" charset="0"/>
+                <a:ea typeface="Calibri" panose="020F0502020204030204" pitchFamily="34" charset="0"/>
                 <a:cs typeface="Times New Roman" panose="02020603050405020304" pitchFamily="18" charset="0"/>
               </a:rPr>
-              <a:t>Features:</a:t>
-            </a:r>
-          </a:p>
-          <a:p>
-            <a:r>
-              <a:rPr lang="en-US" sz="3200" dirty="0">
+              <a:t>:</a:t>
+            </a:r>
+            <a:endParaRPr lang="en-US" sz="1600" kern="100" dirty="0">
+              <a:effectLst/>
+              <a:latin typeface="Times New Roman" panose="02020603050405020304" pitchFamily="18" charset="0"/>
+              <a:ea typeface="Calibri" panose="020F0502020204030204" pitchFamily="34" charset="0"/>
+              <a:cs typeface="Times New Roman" panose="02020603050405020304" pitchFamily="18" charset="0"/>
+            </a:endParaRPr>
+          </a:p>
+          <a:p>
+            <a:pPr marL="0" marR="0">
+              <a:lnSpc>
+                <a:spcPct val="200000"/>
+              </a:lnSpc>
+              <a:spcAft>
+                <a:spcPts val="800"/>
+              </a:spcAft>
+              <a:buNone/>
+            </a:pPr>
+            <a:r>
+              <a:rPr lang="en-US" sz="1600" kern="100" dirty="0">
+                <a:effectLst/>
                 <a:latin typeface="Times New Roman" panose="02020603050405020304" pitchFamily="18" charset="0"/>
+                <a:ea typeface="Calibri" panose="020F0502020204030204" pitchFamily="34" charset="0"/>
                 <a:cs typeface="Times New Roman" panose="02020603050405020304" pitchFamily="18" charset="0"/>
               </a:rPr>
-              <a:t>   Add, update, delete, and display students</a:t>
-            </a:r>
-          </a:p>
-          <a:p>
-            <a:r>
-              <a:rPr lang="en-US" sz="3200" dirty="0">
+              <a:t>1</a:t>
+            </a:r>
+            <a:r>
+              <a:rPr lang="en-US" sz="2000" kern="100" dirty="0">
+                <a:effectLst/>
                 <a:latin typeface="Times New Roman" panose="02020603050405020304" pitchFamily="18" charset="0"/>
+                <a:ea typeface="Calibri" panose="020F0502020204030204" pitchFamily="34" charset="0"/>
                 <a:cs typeface="Times New Roman" panose="02020603050405020304" pitchFamily="18" charset="0"/>
               </a:rPr>
-              <a:t>   Console and GUI interfaces</a:t>
-            </a:r>
-          </a:p>
-          <a:p>
-            <a:r>
-              <a:rPr lang="en-US" sz="3200" dirty="0">
+              <a:t>. </a:t>
+            </a:r>
+            <a:r>
+              <a:rPr lang="en-US" sz="2000" kern="100">
+                <a:effectLst/>
                 <a:latin typeface="Times New Roman" panose="02020603050405020304" pitchFamily="18" charset="0"/>
+                <a:ea typeface="Calibri" panose="020F0502020204030204" pitchFamily="34" charset="0"/>
                 <a:cs typeface="Times New Roman" panose="02020603050405020304" pitchFamily="18" charset="0"/>
               </a:rPr>
-              <a:t>   Data persistence with file storage</a:t>
-            </a:r>
-          </a:p>
-          <a:p>
-            <a:r>
-              <a:rPr lang="en-US" sz="3200" dirty="0">
+              <a:t>HILLARY ANUNDA-BSSEC01/1597/2022 (GROUP LEADER)</a:t>
+            </a:r>
+            <a:endParaRPr lang="en-US" sz="2000" kern="100" dirty="0">
+              <a:effectLst/>
+              <a:latin typeface="Calibri" panose="020F0502020204030204" pitchFamily="34" charset="0"/>
+              <a:ea typeface="Calibri" panose="020F0502020204030204" pitchFamily="34" charset="0"/>
+              <a:cs typeface="Times New Roman" panose="02020603050405020304" pitchFamily="18" charset="0"/>
+            </a:endParaRPr>
+          </a:p>
+          <a:p>
+            <a:pPr marL="0" marR="0">
+              <a:lnSpc>
+                <a:spcPct val="200000"/>
+              </a:lnSpc>
+              <a:spcAft>
+                <a:spcPts val="800"/>
+              </a:spcAft>
+              <a:buNone/>
+            </a:pPr>
+            <a:r>
+              <a:rPr lang="en-US" sz="2000" kern="100" dirty="0">
+                <a:effectLst/>
                 <a:latin typeface="Times New Roman" panose="02020603050405020304" pitchFamily="18" charset="0"/>
+                <a:ea typeface="Calibri" panose="020F0502020204030204" pitchFamily="34" charset="0"/>
                 <a:cs typeface="Times New Roman" panose="02020603050405020304" pitchFamily="18" charset="0"/>
               </a:rPr>
-              <a:t>   Multithreading support</a:t>
-            </a:r>
-          </a:p>
-          <a:p>
-            <a:pPr>
-              <a:buFont typeface="Wingdings" panose="05000000000000000000" pitchFamily="2" charset="2"/>
-              <a:buChar char="ü"/>
+              <a:t>2. VICTOR MAGAMBO-C028/402110/2023</a:t>
+            </a:r>
+            <a:endParaRPr lang="en-US" sz="2000" kern="100" dirty="0">
+              <a:effectLst/>
+              <a:latin typeface="Calibri" panose="020F0502020204030204" pitchFamily="34" charset="0"/>
+              <a:ea typeface="Calibri" panose="020F0502020204030204" pitchFamily="34" charset="0"/>
+              <a:cs typeface="Times New Roman" panose="02020603050405020304" pitchFamily="18" charset="0"/>
+            </a:endParaRPr>
+          </a:p>
+          <a:p>
+            <a:pPr marL="0" marR="0">
+              <a:lnSpc>
+                <a:spcPct val="200000"/>
+              </a:lnSpc>
+              <a:spcAft>
+                <a:spcPts val="800"/>
+              </a:spcAft>
+              <a:buNone/>
             </a:pPr>
             <a:r>
-              <a:rPr lang="en-US" sz="3200" dirty="0">
+              <a:rPr lang="en-US" sz="2000" kern="100" dirty="0">
+                <a:effectLst/>
                 <a:latin typeface="Times New Roman" panose="02020603050405020304" pitchFamily="18" charset="0"/>
+                <a:ea typeface="Calibri" panose="020F0502020204030204" pitchFamily="34" charset="0"/>
                 <a:cs typeface="Times New Roman" panose="02020603050405020304" pitchFamily="18" charset="0"/>
               </a:rPr>
-              <a:t>The files used for the project were:</a:t>
-            </a:r>
+              <a:t>3. IAN KIPKEMBOI-C028/401623/2023</a:t>
+            </a:r>
+            <a:endParaRPr lang="en-US" sz="2000" kern="100" dirty="0">
+              <a:effectLst/>
+              <a:latin typeface="Calibri" panose="020F0502020204030204" pitchFamily="34" charset="0"/>
+              <a:ea typeface="Calibri" panose="020F0502020204030204" pitchFamily="34" charset="0"/>
+              <a:cs typeface="Times New Roman" panose="02020603050405020304" pitchFamily="18" charset="0"/>
+            </a:endParaRPr>
+          </a:p>
+          <a:p>
+            <a:pPr marL="0" marR="0">
+              <a:lnSpc>
+                <a:spcPct val="200000"/>
+              </a:lnSpc>
+              <a:spcAft>
+                <a:spcPts val="800"/>
+              </a:spcAft>
+              <a:buNone/>
+            </a:pPr>
+            <a:r>
+              <a:rPr lang="en-US" sz="2000" kern="100" dirty="0">
+                <a:effectLst/>
+                <a:latin typeface="Times New Roman" panose="02020603050405020304" pitchFamily="18" charset="0"/>
+                <a:ea typeface="Calibri" panose="020F0502020204030204" pitchFamily="34" charset="0"/>
+                <a:cs typeface="Times New Roman" panose="02020603050405020304" pitchFamily="18" charset="0"/>
+              </a:rPr>
+              <a:t>4. STALLONE MUSIGAH-BSSEC01/1159/2021</a:t>
+            </a:r>
+            <a:endParaRPr lang="en-US" sz="2000" kern="100" dirty="0">
+              <a:effectLst/>
+              <a:latin typeface="Calibri" panose="020F0502020204030204" pitchFamily="34" charset="0"/>
+              <a:ea typeface="Calibri" panose="020F0502020204030204" pitchFamily="34" charset="0"/>
+              <a:cs typeface="Times New Roman" panose="02020603050405020304" pitchFamily="18" charset="0"/>
+            </a:endParaRPr>
+          </a:p>
+          <a:p>
+            <a:pPr marL="0" marR="0">
+              <a:lnSpc>
+                <a:spcPct val="200000"/>
+              </a:lnSpc>
+              <a:spcAft>
+                <a:spcPts val="800"/>
+              </a:spcAft>
+              <a:buNone/>
+            </a:pPr>
+            <a:r>
+              <a:rPr lang="en-US" sz="2000" kern="100" dirty="0">
+                <a:effectLst/>
+                <a:latin typeface="Times New Roman" panose="02020603050405020304" pitchFamily="18" charset="0"/>
+                <a:ea typeface="Calibri" panose="020F0502020204030204" pitchFamily="34" charset="0"/>
+                <a:cs typeface="Times New Roman" panose="02020603050405020304" pitchFamily="18" charset="0"/>
+              </a:rPr>
+              <a:t>5. ⁠EVA-PEACE KINYA-C028/401605/2023</a:t>
+            </a:r>
+            <a:endParaRPr lang="en-US" sz="2000" kern="100" dirty="0">
+              <a:effectLst/>
+              <a:latin typeface="Calibri" panose="020F0502020204030204" pitchFamily="34" charset="0"/>
+              <a:ea typeface="Calibri" panose="020F0502020204030204" pitchFamily="34" charset="0"/>
+              <a:cs typeface="Times New Roman" panose="02020603050405020304" pitchFamily="18" charset="0"/>
+            </a:endParaRPr>
+          </a:p>
+          <a:p>
+            <a:pPr marL="0" marR="0">
+              <a:lnSpc>
+                <a:spcPct val="200000"/>
+              </a:lnSpc>
+              <a:spcAft>
+                <a:spcPts val="800"/>
+              </a:spcAft>
+              <a:buNone/>
+            </a:pPr>
+            <a:r>
+              <a:rPr lang="en-US" sz="2000" kern="100" dirty="0">
+                <a:effectLst/>
+                <a:latin typeface="Times New Roman" panose="02020603050405020304" pitchFamily="18" charset="0"/>
+                <a:ea typeface="Calibri" panose="020F0502020204030204" pitchFamily="34" charset="0"/>
+                <a:cs typeface="Times New Roman" panose="02020603050405020304" pitchFamily="18" charset="0"/>
+              </a:rPr>
+              <a:t>6. MARCELLUS MOTITO -C028/401616/2023</a:t>
+            </a:r>
+            <a:endParaRPr lang="en-US" sz="2000" kern="100" dirty="0">
+              <a:effectLst/>
+              <a:latin typeface="Calibri" panose="020F0502020204030204" pitchFamily="34" charset="0"/>
+              <a:ea typeface="Calibri" panose="020F0502020204030204" pitchFamily="34" charset="0"/>
+              <a:cs typeface="Times New Roman" panose="02020603050405020304" pitchFamily="18" charset="0"/>
+            </a:endParaRPr>
+          </a:p>
+          <a:p>
+            <a:endParaRPr lang="en-US" dirty="0"/>
           </a:p>
         </p:txBody>
       </p:sp>
     </p:spTree>
     <p:extLst>
       <p:ext uri="{BB962C8B-B14F-4D97-AF65-F5344CB8AC3E}">
-        <p14:creationId xmlns:p14="http://schemas.microsoft.com/office/powerpoint/2010/main" val="1109433873"/>
+        <p14:creationId xmlns:p14="http://schemas.microsoft.com/office/powerpoint/2010/main" val="2040667896"/>
       </p:ext>
     </p:extLst>
   </p:cSld>
@@ -5792,7 +6029,7 @@
           <p:cNvPr id="3" name="Content Placeholder 2">
             <a:extLst>
               <a:ext uri="{FF2B5EF4-FFF2-40B4-BE49-F238E27FC236}">
-                <a16:creationId xmlns:a16="http://schemas.microsoft.com/office/drawing/2014/main" id="{2153BD62-59A5-C280-6A0E-F3EEA5D0055C}"/>
+                <a16:creationId xmlns:a16="http://schemas.microsoft.com/office/drawing/2014/main" id="{FE2A64CE-A892-4721-44D5-44CFC7478F69}"/>
               </a:ext>
             </a:extLst>
           </p:cNvPr>
@@ -5805,8 +6042,8 @@
         </p:nvSpPr>
         <p:spPr>
           <a:xfrm>
-            <a:off x="913795" y="314325"/>
-            <a:ext cx="10353762" cy="6343650"/>
+            <a:off x="919119" y="724463"/>
+            <a:ext cx="10353762" cy="5876361"/>
           </a:xfrm>
         </p:spPr>
         <p:txBody>
@@ -5815,44 +6052,80 @@
           </a:bodyPr>
           <a:lstStyle/>
           <a:p>
-            <a:pPr marL="2743200" lvl="6" indent="0">
+            <a:pPr marL="0" indent="0">
               <a:buNone/>
             </a:pPr>
             <a:r>
-              <a:rPr lang="en-US" sz="3600" u="sng" dirty="0"/>
-              <a:t>Student.java</a:t>
-            </a:r>
-          </a:p>
-          <a:p>
-            <a:r>
-              <a:rPr lang="en-US" sz="3600" dirty="0"/>
-              <a:t>Represents a student entity</a:t>
-            </a:r>
-          </a:p>
-          <a:p>
-            <a:r>
-              <a:rPr lang="en-US" sz="3600" dirty="0"/>
-              <a:t> Fields: name, id, course, grade</a:t>
-            </a:r>
-          </a:p>
-          <a:p>
-            <a:r>
-              <a:rPr lang="en-US" sz="3600" dirty="0"/>
-              <a:t> Encapsulation with getters and setters</a:t>
-            </a:r>
-          </a:p>
-          <a:p>
-            <a:r>
-              <a:rPr lang="en-US" sz="3600" dirty="0"/>
-              <a:t> </a:t>
-            </a:r>
-            <a:r>
-              <a:rPr lang="en-US" sz="3600" dirty="0" err="1"/>
-              <a:t>toString</a:t>
-            </a:r>
-            <a:r>
-              <a:rPr lang="en-US" sz="3600" dirty="0"/>
-              <a:t>() method for display</a:t>
+              <a:rPr lang="en-US" sz="3200" dirty="0">
+                <a:latin typeface="Times New Roman" panose="02020603050405020304" pitchFamily="18" charset="0"/>
+                <a:cs typeface="Times New Roman" panose="02020603050405020304" pitchFamily="18" charset="0"/>
+              </a:rPr>
+              <a:t>            </a:t>
+            </a:r>
+            <a:r>
+              <a:rPr lang="en-US" sz="3200" u="sng" dirty="0">
+                <a:latin typeface="Times New Roman" panose="02020603050405020304" pitchFamily="18" charset="0"/>
+                <a:cs typeface="Times New Roman" panose="02020603050405020304" pitchFamily="18" charset="0"/>
+              </a:rPr>
+              <a:t>Purpose: Manage student records efficiently</a:t>
+            </a:r>
+          </a:p>
+          <a:p>
+            <a:r>
+              <a:rPr lang="en-US" sz="3200" dirty="0">
+                <a:latin typeface="Times New Roman" panose="02020603050405020304" pitchFamily="18" charset="0"/>
+                <a:cs typeface="Times New Roman" panose="02020603050405020304" pitchFamily="18" charset="0"/>
+              </a:rPr>
+              <a:t>Features:</a:t>
+            </a:r>
+          </a:p>
+          <a:p>
+            <a:r>
+              <a:rPr lang="en-US" sz="3200" dirty="0">
+                <a:latin typeface="Times New Roman" panose="02020603050405020304" pitchFamily="18" charset="0"/>
+                <a:cs typeface="Times New Roman" panose="02020603050405020304" pitchFamily="18" charset="0"/>
+              </a:rPr>
+              <a:t>   Add, update, delete, and display students</a:t>
+            </a:r>
+          </a:p>
+          <a:p>
+            <a:r>
+              <a:rPr lang="en-US" sz="3200" dirty="0">
+                <a:latin typeface="Times New Roman" panose="02020603050405020304" pitchFamily="18" charset="0"/>
+                <a:cs typeface="Times New Roman" panose="02020603050405020304" pitchFamily="18" charset="0"/>
+              </a:rPr>
+              <a:t>   Console and GUI interfaces</a:t>
+            </a:r>
+          </a:p>
+          <a:p>
+            <a:r>
+              <a:rPr lang="en-US" sz="3200" dirty="0">
+                <a:latin typeface="Times New Roman" panose="02020603050405020304" pitchFamily="18" charset="0"/>
+                <a:cs typeface="Times New Roman" panose="02020603050405020304" pitchFamily="18" charset="0"/>
+              </a:rPr>
+              <a:t>   Data persistence with file storage</a:t>
+            </a:r>
+          </a:p>
+          <a:p>
+            <a:r>
+              <a:rPr lang="en-US" sz="3200" dirty="0">
+                <a:latin typeface="Times New Roman" panose="02020603050405020304" pitchFamily="18" charset="0"/>
+                <a:cs typeface="Times New Roman" panose="02020603050405020304" pitchFamily="18" charset="0"/>
+              </a:rPr>
+              <a:t>   Multithreading support</a:t>
+            </a:r>
+          </a:p>
+          <a:p>
+            <a:pPr>
+              <a:buFont typeface="Wingdings" panose="05000000000000000000" pitchFamily="2" charset="2"/>
+              <a:buChar char="ü"/>
+            </a:pPr>
+            <a:r>
+              <a:rPr lang="en-US" sz="3200" dirty="0">
+                <a:latin typeface="Times New Roman" panose="02020603050405020304" pitchFamily="18" charset="0"/>
+                <a:cs typeface="Times New Roman" panose="02020603050405020304" pitchFamily="18" charset="0"/>
+              </a:rPr>
+              <a:t>The files used for the project were:</a:t>
             </a:r>
           </a:p>
         </p:txBody>
@@ -5860,7 +6133,7 @@
     </p:spTree>
     <p:extLst>
       <p:ext uri="{BB962C8B-B14F-4D97-AF65-F5344CB8AC3E}">
-        <p14:creationId xmlns:p14="http://schemas.microsoft.com/office/powerpoint/2010/main" val="2452534935"/>
+        <p14:creationId xmlns:p14="http://schemas.microsoft.com/office/powerpoint/2010/main" val="1109433873"/>
       </p:ext>
     </p:extLst>
   </p:cSld>
@@ -5892,7 +6165,7 @@
           <p:cNvPr id="3" name="Content Placeholder 2">
             <a:extLst>
               <a:ext uri="{FF2B5EF4-FFF2-40B4-BE49-F238E27FC236}">
-                <a16:creationId xmlns:a16="http://schemas.microsoft.com/office/drawing/2014/main" id="{30780636-C58F-4020-1B24-B24444F3878D}"/>
+                <a16:creationId xmlns:a16="http://schemas.microsoft.com/office/drawing/2014/main" id="{2153BD62-59A5-C280-6A0E-F3EEA5D0055C}"/>
               </a:ext>
             </a:extLst>
           </p:cNvPr>
@@ -5905,8 +6178,8 @@
         </p:nvSpPr>
         <p:spPr>
           <a:xfrm>
-            <a:off x="913795" y="228599"/>
-            <a:ext cx="10353762" cy="6257925"/>
+            <a:off x="913795" y="314325"/>
+            <a:ext cx="10353762" cy="6343650"/>
           </a:xfrm>
         </p:spPr>
         <p:txBody>
@@ -5915,42 +6188,44 @@
           </a:bodyPr>
           <a:lstStyle/>
           <a:p>
-            <a:pPr marL="1371600" lvl="3" indent="0">
+            <a:pPr marL="2743200" lvl="6" indent="0">
               <a:buNone/>
             </a:pPr>
             <a:r>
-              <a:rPr lang="en-US" sz="3000" u="sng" dirty="0"/>
-              <a:t>StudentManagementSystem.java</a:t>
+              <a:rPr lang="en-US" sz="3600" u="sng" dirty="0"/>
+              <a:t>Student.java</a:t>
             </a:r>
           </a:p>
           <a:p>
             <a:r>
               <a:rPr lang="en-US" sz="3600" dirty="0"/>
-              <a:t>Core system managing students</a:t>
+              <a:t>Represents a student entity</a:t>
             </a:r>
           </a:p>
           <a:p>
             <a:r>
               <a:rPr lang="en-US" sz="3600" dirty="0"/>
-              <a:t>Uses ArrayList to store students</a:t>
+              <a:t> Fields: name, id, course, grade</a:t>
             </a:r>
           </a:p>
           <a:p>
             <a:r>
               <a:rPr lang="en-US" sz="3600" dirty="0"/>
-              <a:t>Synchronized methods for thread safety</a:t>
+              <a:t> Encapsulation with getters and setters</a:t>
             </a:r>
           </a:p>
           <a:p>
             <a:r>
               <a:rPr lang="en-US" sz="3600" dirty="0"/>
-              <a:t>Input validation and exception handling</a:t>
-            </a:r>
-          </a:p>
-          <a:p>
+              <a:t> </a:t>
+            </a:r>
+            <a:r>
+              <a:rPr lang="en-US" sz="3600" dirty="0" err="1"/>
+              <a:t>toString</a:t>
+            </a:r>
             <a:r>
               <a:rPr lang="en-US" sz="3600" dirty="0"/>
-              <a:t>File I/O for data persistence</a:t>
+              <a:t>() method for display</a:t>
             </a:r>
           </a:p>
         </p:txBody>
@@ -5958,7 +6233,7 @@
     </p:spTree>
     <p:extLst>
       <p:ext uri="{BB962C8B-B14F-4D97-AF65-F5344CB8AC3E}">
-        <p14:creationId xmlns:p14="http://schemas.microsoft.com/office/powerpoint/2010/main" val="3176673362"/>
+        <p14:creationId xmlns:p14="http://schemas.microsoft.com/office/powerpoint/2010/main" val="2452534935"/>
       </p:ext>
     </p:extLst>
   </p:cSld>
@@ -5990,7 +6265,7 @@
           <p:cNvPr id="3" name="Content Placeholder 2">
             <a:extLst>
               <a:ext uri="{FF2B5EF4-FFF2-40B4-BE49-F238E27FC236}">
-                <a16:creationId xmlns:a16="http://schemas.microsoft.com/office/drawing/2014/main" id="{23B4163B-EB5C-F125-0D5A-89D6E160A597}"/>
+                <a16:creationId xmlns:a16="http://schemas.microsoft.com/office/drawing/2014/main" id="{30780636-C58F-4020-1B24-B24444F3878D}"/>
               </a:ext>
             </a:extLst>
           </p:cNvPr>
@@ -6003,8 +6278,8 @@
         </p:nvSpPr>
         <p:spPr>
           <a:xfrm>
-            <a:off x="913795" y="0"/>
-            <a:ext cx="10353762" cy="6858000"/>
+            <a:off x="913795" y="228599"/>
+            <a:ext cx="10353762" cy="6257925"/>
           </a:xfrm>
         </p:spPr>
         <p:txBody>
@@ -6013,54 +6288,42 @@
           </a:bodyPr>
           <a:lstStyle/>
           <a:p>
-            <a:pPr marL="0" indent="0">
+            <a:pPr marL="1371600" lvl="3" indent="0">
               <a:buNone/>
             </a:pPr>
             <a:r>
-              <a:rPr lang="en-US" sz="4400" dirty="0"/>
-              <a:t>             </a:t>
-            </a:r>
-            <a:r>
-              <a:rPr lang="en-US" sz="4400" u="sng" dirty="0"/>
-              <a:t>ConsoleInterface.java</a:t>
-            </a:r>
-          </a:p>
-          <a:p>
-            <a:r>
-              <a:rPr lang="en-US" sz="4400" dirty="0"/>
-              <a:t>Console-based user interface</a:t>
-            </a:r>
-          </a:p>
-          <a:p>
-            <a:r>
-              <a:rPr lang="en-US" sz="4400" dirty="0"/>
-              <a:t>Menu-driven interaction</a:t>
-            </a:r>
-          </a:p>
-          <a:p>
-            <a:r>
-              <a:rPr lang="en-US" sz="4400" dirty="0"/>
-              <a:t>Uses Scanner for input</a:t>
-            </a:r>
-          </a:p>
-          <a:p>
-            <a:r>
-              <a:rPr lang="en-US" sz="4400" dirty="0"/>
-              <a:t>Handles invalid inputs gracefully</a:t>
-            </a:r>
-          </a:p>
-          <a:p>
-            <a:r>
-              <a:rPr lang="en-US" sz="4400" dirty="0"/>
-              <a:t>Calls </a:t>
-            </a:r>
-            <a:r>
-              <a:rPr lang="en-US" sz="4400" dirty="0" err="1"/>
-              <a:t>StudentManagementSystem</a:t>
-            </a:r>
-            <a:r>
-              <a:rPr lang="en-US" sz="4400" dirty="0"/>
-              <a:t> methods</a:t>
+              <a:rPr lang="en-US" sz="3000" u="sng" dirty="0"/>
+              <a:t>StudentManagementSystem.java</a:t>
+            </a:r>
+          </a:p>
+          <a:p>
+            <a:r>
+              <a:rPr lang="en-US" sz="3600" dirty="0"/>
+              <a:t>Core system managing students</a:t>
+            </a:r>
+          </a:p>
+          <a:p>
+            <a:r>
+              <a:rPr lang="en-US" sz="3600" dirty="0"/>
+              <a:t>Uses ArrayList to store students</a:t>
+            </a:r>
+          </a:p>
+          <a:p>
+            <a:r>
+              <a:rPr lang="en-US" sz="3600" dirty="0"/>
+              <a:t>Synchronized methods for thread safety</a:t>
+            </a:r>
+          </a:p>
+          <a:p>
+            <a:r>
+              <a:rPr lang="en-US" sz="3600" dirty="0"/>
+              <a:t>Input validation and exception handling</a:t>
+            </a:r>
+          </a:p>
+          <a:p>
+            <a:r>
+              <a:rPr lang="en-US" sz="3600" dirty="0"/>
+              <a:t>File I/O for data persistence</a:t>
             </a:r>
           </a:p>
         </p:txBody>
@@ -6068,7 +6331,7 @@
     </p:spTree>
     <p:extLst>
       <p:ext uri="{BB962C8B-B14F-4D97-AF65-F5344CB8AC3E}">
-        <p14:creationId xmlns:p14="http://schemas.microsoft.com/office/powerpoint/2010/main" val="763497046"/>
+        <p14:creationId xmlns:p14="http://schemas.microsoft.com/office/powerpoint/2010/main" val="3176673362"/>
       </p:ext>
     </p:extLst>
   </p:cSld>
@@ -6100,7 +6363,7 @@
           <p:cNvPr id="3" name="Content Placeholder 2">
             <a:extLst>
               <a:ext uri="{FF2B5EF4-FFF2-40B4-BE49-F238E27FC236}">
-                <a16:creationId xmlns:a16="http://schemas.microsoft.com/office/drawing/2014/main" id="{366BDCB5-8C7B-003F-C08A-008C38B1D688}"/>
+                <a16:creationId xmlns:a16="http://schemas.microsoft.com/office/drawing/2014/main" id="{23B4163B-EB5C-F125-0D5A-89D6E160A597}"/>
               </a:ext>
             </a:extLst>
           </p:cNvPr>
@@ -6127,64 +6390,58 @@
               <a:buNone/>
             </a:pPr>
             <a:r>
-              <a:rPr lang="en-US" sz="3600" dirty="0"/>
-              <a:t>          </a:t>
-            </a:r>
-            <a:r>
-              <a:rPr lang="en-US" sz="3600" u="sng" dirty="0"/>
-              <a:t>StudentManagementGUI.java</a:t>
-            </a:r>
-          </a:p>
-          <a:p>
-            <a:r>
-              <a:rPr lang="en-US" sz="3600" dirty="0"/>
-              <a:t>JavaFX graphical user interface</a:t>
-            </a:r>
-          </a:p>
-          <a:p>
-            <a:r>
-              <a:rPr lang="en-US" sz="3600" dirty="0" err="1"/>
-              <a:t>GridPane</a:t>
-            </a:r>
-            <a:r>
-              <a:rPr lang="en-US" sz="3600" dirty="0"/>
-              <a:t> layout with input fields and buttons</a:t>
-            </a:r>
-          </a:p>
-          <a:p>
-            <a:r>
-              <a:rPr lang="en-US" sz="3600" dirty="0"/>
-              <a:t>Event-driven programming with button handlers</a:t>
-            </a:r>
-          </a:p>
-          <a:p>
-            <a:r>
-              <a:rPr lang="en-US" sz="3600" dirty="0"/>
-              <a:t>Displays output in </a:t>
-            </a:r>
-            <a:r>
-              <a:rPr lang="en-US" sz="3600" dirty="0" err="1"/>
-              <a:t>TextArea</a:t>
-            </a:r>
-            <a:endParaRPr lang="en-US" sz="3600" dirty="0"/>
-          </a:p>
-          <a:p>
-            <a:r>
-              <a:rPr lang="en-US" sz="3600" dirty="0"/>
-              <a:t>Interacts with </a:t>
-            </a:r>
-            <a:r>
-              <a:rPr lang="en-US" sz="3600" dirty="0" err="1"/>
+              <a:rPr lang="en-US" sz="4400" dirty="0"/>
+              <a:t>             </a:t>
+            </a:r>
+            <a:r>
+              <a:rPr lang="en-US" sz="4400" u="sng" dirty="0"/>
+              <a:t>ConsoleInterface.java</a:t>
+            </a:r>
+          </a:p>
+          <a:p>
+            <a:r>
+              <a:rPr lang="en-US" sz="4400" dirty="0"/>
+              <a:t>Console-based user interface</a:t>
+            </a:r>
+          </a:p>
+          <a:p>
+            <a:r>
+              <a:rPr lang="en-US" sz="4400" dirty="0"/>
+              <a:t>Menu-driven interaction</a:t>
+            </a:r>
+          </a:p>
+          <a:p>
+            <a:r>
+              <a:rPr lang="en-US" sz="4400" dirty="0"/>
+              <a:t>Uses Scanner for input</a:t>
+            </a:r>
+          </a:p>
+          <a:p>
+            <a:r>
+              <a:rPr lang="en-US" sz="4400" dirty="0"/>
+              <a:t>Handles invalid inputs gracefully</a:t>
+            </a:r>
+          </a:p>
+          <a:p>
+            <a:r>
+              <a:rPr lang="en-US" sz="4400" dirty="0"/>
+              <a:t>Calls </a:t>
+            </a:r>
+            <a:r>
+              <a:rPr lang="en-US" sz="4400" dirty="0" err="1"/>
               <a:t>StudentManagementSystem</a:t>
             </a:r>
-            <a:endParaRPr lang="en-US" sz="3600" dirty="0"/>
+            <a:r>
+              <a:rPr lang="en-US" sz="4400" dirty="0"/>
+              <a:t> methods</a:t>
+            </a:r>
           </a:p>
         </p:txBody>
       </p:sp>
     </p:spTree>
     <p:extLst>
       <p:ext uri="{BB962C8B-B14F-4D97-AF65-F5344CB8AC3E}">
-        <p14:creationId xmlns:p14="http://schemas.microsoft.com/office/powerpoint/2010/main" val="3586264208"/>
+        <p14:creationId xmlns:p14="http://schemas.microsoft.com/office/powerpoint/2010/main" val="763497046"/>
       </p:ext>
     </p:extLst>
   </p:cSld>
@@ -6216,7 +6473,7 @@
           <p:cNvPr id="3" name="Content Placeholder 2">
             <a:extLst>
               <a:ext uri="{FF2B5EF4-FFF2-40B4-BE49-F238E27FC236}">
-                <a16:creationId xmlns:a16="http://schemas.microsoft.com/office/drawing/2014/main" id="{A75026D8-1431-6B06-684C-5388040191E4}"/>
+                <a16:creationId xmlns:a16="http://schemas.microsoft.com/office/drawing/2014/main" id="{366BDCB5-8C7B-003F-C08A-008C38B1D688}"/>
               </a:ext>
             </a:extLst>
           </p:cNvPr>
@@ -6243,44 +6500,64 @@
               <a:buNone/>
             </a:pPr>
             <a:r>
-              <a:rPr lang="en-US" sz="4000" dirty="0"/>
-              <a:t>                </a:t>
-            </a:r>
-            <a:r>
-              <a:rPr lang="en-US" sz="4000" u="sng" dirty="0"/>
-              <a:t>Main.java</a:t>
-            </a:r>
-          </a:p>
-          <a:p>
-            <a:r>
-              <a:rPr lang="en-US" sz="4000" dirty="0"/>
-              <a:t>Application entry point</a:t>
-            </a:r>
-          </a:p>
-          <a:p>
-            <a:r>
-              <a:rPr lang="en-US" sz="4000" dirty="0"/>
-              <a:t>Starts console interface</a:t>
-            </a:r>
-          </a:p>
-          <a:p>
-            <a:r>
-              <a:rPr lang="en-US" sz="4000" dirty="0"/>
-              <a:t>Demonstrates multithreading with threads adding students</a:t>
-            </a:r>
-          </a:p>
-          <a:p>
-            <a:r>
-              <a:rPr lang="en-US" sz="4000" dirty="0"/>
-              <a:t>Option to launch GUI</a:t>
-            </a:r>
+              <a:rPr lang="en-US" sz="3600" dirty="0"/>
+              <a:t>          </a:t>
+            </a:r>
+            <a:r>
+              <a:rPr lang="en-US" sz="3600" u="sng" dirty="0"/>
+              <a:t>StudentManagementGUI.java</a:t>
+            </a:r>
+          </a:p>
+          <a:p>
+            <a:r>
+              <a:rPr lang="en-US" sz="3600" dirty="0"/>
+              <a:t>JavaFX graphical user interface</a:t>
+            </a:r>
+          </a:p>
+          <a:p>
+            <a:r>
+              <a:rPr lang="en-US" sz="3600" dirty="0" err="1"/>
+              <a:t>GridPane</a:t>
+            </a:r>
+            <a:r>
+              <a:rPr lang="en-US" sz="3600" dirty="0"/>
+              <a:t> layout with input fields and buttons</a:t>
+            </a:r>
+          </a:p>
+          <a:p>
+            <a:r>
+              <a:rPr lang="en-US" sz="3600" dirty="0"/>
+              <a:t>Event-driven programming with button handlers</a:t>
+            </a:r>
+          </a:p>
+          <a:p>
+            <a:r>
+              <a:rPr lang="en-US" sz="3600" dirty="0"/>
+              <a:t>Displays output in </a:t>
+            </a:r>
+            <a:r>
+              <a:rPr lang="en-US" sz="3600" dirty="0" err="1"/>
+              <a:t>TextArea</a:t>
+            </a:r>
+            <a:endParaRPr lang="en-US" sz="3600" dirty="0"/>
+          </a:p>
+          <a:p>
+            <a:r>
+              <a:rPr lang="en-US" sz="3600" dirty="0"/>
+              <a:t>Interacts with </a:t>
+            </a:r>
+            <a:r>
+              <a:rPr lang="en-US" sz="3600" dirty="0" err="1"/>
+              <a:t>StudentManagementSystem</a:t>
+            </a:r>
+            <a:endParaRPr lang="en-US" sz="3600" dirty="0"/>
           </a:p>
         </p:txBody>
       </p:sp>
     </p:spTree>
     <p:extLst>
       <p:ext uri="{BB962C8B-B14F-4D97-AF65-F5344CB8AC3E}">
-        <p14:creationId xmlns:p14="http://schemas.microsoft.com/office/powerpoint/2010/main" val="1446609192"/>
+        <p14:creationId xmlns:p14="http://schemas.microsoft.com/office/powerpoint/2010/main" val="3586264208"/>
       </p:ext>
     </p:extLst>
   </p:cSld>
@@ -6312,7 +6589,7 @@
           <p:cNvPr id="3" name="Content Placeholder 2">
             <a:extLst>
               <a:ext uri="{FF2B5EF4-FFF2-40B4-BE49-F238E27FC236}">
-                <a16:creationId xmlns:a16="http://schemas.microsoft.com/office/drawing/2014/main" id="{F6BE7BAF-BF68-F30A-0CAA-CB6F2253F480}"/>
+                <a16:creationId xmlns:a16="http://schemas.microsoft.com/office/drawing/2014/main" id="{A75026D8-1431-6B06-684C-5388040191E4}"/>
               </a:ext>
             </a:extLst>
           </p:cNvPr>
@@ -6339,48 +6616,36 @@
               <a:buNone/>
             </a:pPr>
             <a:r>
-              <a:rPr lang="en-US" sz="3600" dirty="0"/>
-              <a:t>                 </a:t>
-            </a:r>
-            <a:r>
-              <a:rPr lang="en-US" sz="3600" u="sng" dirty="0"/>
-              <a:t>Key Concepts Used</a:t>
-            </a:r>
-          </a:p>
-          <a:p>
-            <a:r>
-              <a:rPr lang="en-US" sz="3600" dirty="0"/>
-              <a:t>Object-Oriented Programming (OOP)</a:t>
-            </a:r>
-          </a:p>
-          <a:p>
-            <a:r>
-              <a:rPr lang="en-US" sz="3600" dirty="0"/>
-              <a:t>Exception Handling</a:t>
-            </a:r>
-          </a:p>
-          <a:p>
-            <a:r>
-              <a:rPr lang="en-US" sz="3600" dirty="0"/>
-              <a:t>Multithreading and Synchronization</a:t>
-            </a:r>
-          </a:p>
-          <a:p>
-            <a:r>
-              <a:rPr lang="en-US" sz="3600" dirty="0"/>
-              <a:t>File Input/Output (I/O)</a:t>
-            </a:r>
-          </a:p>
-          <a:p>
-            <a:r>
-              <a:rPr lang="en-US" sz="3600" dirty="0"/>
-              <a:t>JavaFX GUI</a:t>
-            </a:r>
-          </a:p>
-          <a:p>
-            <a:r>
-              <a:rPr lang="en-US" sz="3600" dirty="0"/>
-              <a:t>Modern Java Features (Streams, Lambdas)</a:t>
+              <a:rPr lang="en-US" sz="4000" dirty="0"/>
+              <a:t>                </a:t>
+            </a:r>
+            <a:r>
+              <a:rPr lang="en-US" sz="4000" u="sng" dirty="0"/>
+              <a:t>Main.java</a:t>
+            </a:r>
+          </a:p>
+          <a:p>
+            <a:r>
+              <a:rPr lang="en-US" sz="4000" dirty="0"/>
+              <a:t>Application entry point</a:t>
+            </a:r>
+          </a:p>
+          <a:p>
+            <a:r>
+              <a:rPr lang="en-US" sz="4000" dirty="0"/>
+              <a:t>Starts console interface</a:t>
+            </a:r>
+          </a:p>
+          <a:p>
+            <a:r>
+              <a:rPr lang="en-US" sz="4000" dirty="0"/>
+              <a:t>Demonstrates multithreading with threads adding students</a:t>
+            </a:r>
+          </a:p>
+          <a:p>
+            <a:r>
+              <a:rPr lang="en-US" sz="4000" dirty="0"/>
+              <a:t>Option to launch GUI</a:t>
             </a:r>
           </a:p>
         </p:txBody>
@@ -6388,7 +6653,7 @@
     </p:spTree>
     <p:extLst>
       <p:ext uri="{BB962C8B-B14F-4D97-AF65-F5344CB8AC3E}">
-        <p14:creationId xmlns:p14="http://schemas.microsoft.com/office/powerpoint/2010/main" val="637826133"/>
+        <p14:creationId xmlns:p14="http://schemas.microsoft.com/office/powerpoint/2010/main" val="1446609192"/>
       </p:ext>
     </p:extLst>
   </p:cSld>
@@ -6420,7 +6685,7 @@
           <p:cNvPr id="3" name="Content Placeholder 2">
             <a:extLst>
               <a:ext uri="{FF2B5EF4-FFF2-40B4-BE49-F238E27FC236}">
-                <a16:creationId xmlns:a16="http://schemas.microsoft.com/office/drawing/2014/main" id="{11CADB5B-A810-1065-0DBF-FDA0168C899D}"/>
+                <a16:creationId xmlns:a16="http://schemas.microsoft.com/office/drawing/2014/main" id="{F6BE7BAF-BF68-F30A-0CAA-CB6F2253F480}"/>
               </a:ext>
             </a:extLst>
           </p:cNvPr>
@@ -6447,36 +6712,48 @@
               <a:buNone/>
             </a:pPr>
             <a:r>
-              <a:rPr lang="en-US" sz="4000" dirty="0"/>
-              <a:t>                          </a:t>
-            </a:r>
-            <a:r>
-              <a:rPr lang="en-US" sz="4000" u="sng" dirty="0"/>
-              <a:t>Summary</a:t>
-            </a:r>
-          </a:p>
-          <a:p>
-            <a:r>
-              <a:rPr lang="en-US" sz="4000" dirty="0"/>
-              <a:t>Robust student management application</a:t>
-            </a:r>
-          </a:p>
-          <a:p>
-            <a:r>
-              <a:rPr lang="en-US" sz="4000" dirty="0"/>
-              <a:t>Combines console and GUI interfaces</a:t>
-            </a:r>
-          </a:p>
-          <a:p>
-            <a:r>
-              <a:rPr lang="en-US" sz="4000" dirty="0"/>
-              <a:t>Demonstrates core Java programming skills</a:t>
-            </a:r>
-          </a:p>
-          <a:p>
-            <a:r>
-              <a:rPr lang="en-US" sz="4000" dirty="0"/>
-              <a:t>Thread-safe and persistent data management</a:t>
+              <a:rPr lang="en-US" sz="3600" dirty="0"/>
+              <a:t>                 </a:t>
+            </a:r>
+            <a:r>
+              <a:rPr lang="en-US" sz="3600" u="sng" dirty="0"/>
+              <a:t>Key Concepts Used</a:t>
+            </a:r>
+          </a:p>
+          <a:p>
+            <a:r>
+              <a:rPr lang="en-US" sz="3600" dirty="0"/>
+              <a:t>Object-Oriented Programming (OOP)</a:t>
+            </a:r>
+          </a:p>
+          <a:p>
+            <a:r>
+              <a:rPr lang="en-US" sz="3600" dirty="0"/>
+              <a:t>Exception Handling</a:t>
+            </a:r>
+          </a:p>
+          <a:p>
+            <a:r>
+              <a:rPr lang="en-US" sz="3600" dirty="0"/>
+              <a:t>Multithreading and Synchronization</a:t>
+            </a:r>
+          </a:p>
+          <a:p>
+            <a:r>
+              <a:rPr lang="en-US" sz="3600" dirty="0"/>
+              <a:t>File Input/Output (I/O)</a:t>
+            </a:r>
+          </a:p>
+          <a:p>
+            <a:r>
+              <a:rPr lang="en-US" sz="3600" dirty="0"/>
+              <a:t>JavaFX GUI</a:t>
+            </a:r>
+          </a:p>
+          <a:p>
+            <a:r>
+              <a:rPr lang="en-US" sz="3600" dirty="0"/>
+              <a:t>Modern Java Features (Streams, Lambdas)</a:t>
             </a:r>
           </a:p>
         </p:txBody>
@@ -6484,7 +6761,7 @@
     </p:spTree>
     <p:extLst>
       <p:ext uri="{BB962C8B-B14F-4D97-AF65-F5344CB8AC3E}">
-        <p14:creationId xmlns:p14="http://schemas.microsoft.com/office/powerpoint/2010/main" val="4282689825"/>
+        <p14:creationId xmlns:p14="http://schemas.microsoft.com/office/powerpoint/2010/main" val="637826133"/>
       </p:ext>
     </p:extLst>
   </p:cSld>

</xml_diff>